<commit_message>
sheets: fixes sentence & add some slide.
</commit_message>
<xml_diff>
--- a/the_modern_data_management_platform.pptx
+++ b/the_modern_data_management_platform.pptx
@@ -219,7 +219,7 @@
           <a:p>
             <a:fld id="{957BDCDD-9BA2-D54E-A889-124805F6FFE2}" type="datetimeFigureOut">
               <a:rPr lang="en-TH" smtClean="0"/>
-              <a:t>17/9/2023 R</a:t>
+              <a:t>19/9/2023 R</a:t>
             </a:fld>
             <a:endParaRPr lang="en-TH"/>
           </a:p>
@@ -14396,6 +14396,18 @@
   <p:clrMapOvr>
     <a:masterClrMapping/>
   </p:clrMapOvr>
+  <mc:AlternateContent xmlns:mc="http://schemas.openxmlformats.org/markup-compatibility/2006" xmlns:p159="http://schemas.microsoft.com/office/powerpoint/2015/09/main">
+    <mc:Choice Requires="p159">
+      <p:transition xmlns:p14="http://schemas.microsoft.com/office/powerpoint/2010/main" spd="slow" p14:dur="2000">
+        <p159:morph option="byObject"/>
+      </p:transition>
+    </mc:Choice>
+    <mc:Fallback xmlns="">
+      <p:transition spd="slow">
+        <p:fade/>
+      </p:transition>
+    </mc:Fallback>
+  </mc:AlternateContent>
 </p:sld>
 </file>
 
@@ -14492,7 +14504,7 @@
           <a:blipFill>
             <a:blip r:embed="rId3"/>
             <a:stretch>
-              <a:fillRect l="-18451" r="-18451"/>
+              <a:fillRect l="-21868" r="-21868"/>
             </a:stretch>
           </a:blipFill>
           <a:ln>
@@ -15356,13 +15368,13 @@
   <p:clrMapOvr>
     <a:masterClrMapping/>
   </p:clrMapOvr>
-  <mc:AlternateContent xmlns:mc="http://schemas.openxmlformats.org/markup-compatibility/2006">
-    <mc:Choice xmlns:p159="http://schemas.microsoft.com/office/powerpoint/2015/09/main" Requires="p159">
+  <mc:AlternateContent xmlns:mc="http://schemas.openxmlformats.org/markup-compatibility/2006" xmlns:p159="http://schemas.microsoft.com/office/powerpoint/2015/09/main">
+    <mc:Choice Requires="p159">
       <p:transition xmlns:p14="http://schemas.microsoft.com/office/powerpoint/2010/main" spd="slow" p14:dur="2000">
         <p159:morph option="byObject"/>
       </p:transition>
     </mc:Choice>
-    <mc:Fallback>
+    <mc:Fallback xmlns="">
       <p:transition spd="slow">
         <p:fade/>
       </p:transition>
@@ -15752,18 +15764,13 @@
           <a:p>
             <a:pPr algn="ctr"/>
             <a:r>
-              <a:rPr lang="en-US" dirty="0">
-                <a:latin typeface="LINE Seed Sans TH" panose="020B0303020203020204" pitchFamily="34" charset="-34"/>
-                <a:ea typeface="LINE Seed Sans TH" panose="020B0303020203020204" pitchFamily="34" charset="-34"/>
-                <a:cs typeface="LINE Seed Sans TH" panose="020B0303020203020204" pitchFamily="34" charset="-34"/>
-              </a:rPr>
-              <a:t>Apache Kafka Brokers</a:t>
-            </a:r>
-            <a:endParaRPr lang="en-TH" dirty="0">
-              <a:latin typeface="LINE Seed Sans TH" panose="020B0303020203020204" pitchFamily="34" charset="-34"/>
-              <a:ea typeface="LINE Seed Sans TH" panose="020B0303020203020204" pitchFamily="34" charset="-34"/>
-              <a:cs typeface="LINE Seed Sans TH" panose="020B0303020203020204" pitchFamily="34" charset="-34"/>
-            </a:endParaRPr>
+              <a:rPr lang="en-TH" dirty="0">
+                <a:latin typeface="LINE Seed Sans TH" panose="020B0303020203020204" pitchFamily="34" charset="-34"/>
+                <a:ea typeface="LINE Seed Sans TH" panose="020B0303020203020204" pitchFamily="34" charset="-34"/>
+                <a:cs typeface="LINE Seed Sans TH" panose="020B0303020203020204" pitchFamily="34" charset="-34"/>
+              </a:rPr>
+              <a:t>Analysis</a:t>
+            </a:r>
           </a:p>
         </p:txBody>
       </p:sp>
@@ -15823,7 +15830,7 @@
                 <a:ea typeface="LINE Seed Sans TH" panose="020B0303020203020204" pitchFamily="34" charset="-34"/>
                 <a:cs typeface="LINE Seed Sans TH" panose="020B0303020203020204" pitchFamily="34" charset="-34"/>
               </a:rPr>
-              <a:t>Apache Kafka Brokers</a:t>
+              <a:t>Logging</a:t>
             </a:r>
             <a:endParaRPr lang="en-TH" dirty="0">
               <a:latin typeface="LINE Seed Sans TH" panose="020B0303020203020204" pitchFamily="34" charset="-34"/>
@@ -15889,7 +15896,7 @@
                 <a:ea typeface="LINE Seed Sans TH" panose="020B0303020203020204" pitchFamily="34" charset="-34"/>
                 <a:cs typeface="LINE Seed Sans TH" panose="020B0303020203020204" pitchFamily="34" charset="-34"/>
               </a:rPr>
-              <a:t>Apache Kafka Brokers</a:t>
+              <a:t>Others</a:t>
             </a:r>
             <a:endParaRPr lang="en-TH" dirty="0">
               <a:latin typeface="LINE Seed Sans TH" panose="020B0303020203020204" pitchFamily="34" charset="-34"/>
@@ -16149,13 +16156,13 @@
   <p:clrMapOvr>
     <a:masterClrMapping/>
   </p:clrMapOvr>
-  <mc:AlternateContent xmlns:mc="http://schemas.openxmlformats.org/markup-compatibility/2006">
-    <mc:Choice xmlns:p159="http://schemas.microsoft.com/office/powerpoint/2015/09/main" Requires="p159">
+  <mc:AlternateContent xmlns:mc="http://schemas.openxmlformats.org/markup-compatibility/2006" xmlns:p159="http://schemas.microsoft.com/office/powerpoint/2015/09/main">
+    <mc:Choice Requires="p159">
       <p:transition xmlns:p14="http://schemas.microsoft.com/office/powerpoint/2010/main" spd="slow" p14:dur="2000">
         <p159:morph option="byObject"/>
       </p:transition>
     </mc:Choice>
-    <mc:Fallback>
+    <mc:Fallback xmlns="">
       <p:transition spd="slow">
         <p:fade/>
       </p:transition>
@@ -16252,7 +16259,7 @@
         <p:spPr>
           <a:xfrm>
             <a:off x="641057" y="1837944"/>
-            <a:ext cx="6118983" cy="841256"/>
+            <a:ext cx="6530955" cy="841256"/>
           </a:xfrm>
           <a:prstGeom prst="rect">
             <a:avLst/>
@@ -16284,7 +16291,33 @@
                 <a:ea typeface="LINE Seed Sans TH" panose="020B0303020203020204" pitchFamily="34" charset="-34"/>
                 <a:cs typeface="LINE Seed Sans TH" panose="020B0303020203020204" pitchFamily="34" charset="-34"/>
               </a:rPr>
-              <a:t>เป็นแพลตฟอร์มการสตรีมซึ่งเป็นแบบระบบคิวข้อความที่สามารถกระจายการทำงานได้</a:t>
+              <a:t>เป็นแพลตฟอร์มการสตรีมซึ่งเป็นแบบ</a:t>
+            </a:r>
+            <a:r>
+              <a:rPr lang="en-US" sz="1400" dirty="0">
+                <a:solidFill>
+                  <a:schemeClr val="bg1">
+                    <a:lumMod val="50000"/>
+                  </a:schemeClr>
+                </a:solidFill>
+                <a:latin typeface="LINE Seed Sans TH" panose="020B0303020203020204" pitchFamily="34" charset="-34"/>
+                <a:ea typeface="LINE Seed Sans TH" panose="020B0303020203020204" pitchFamily="34" charset="-34"/>
+                <a:cs typeface="LINE Seed Sans TH" panose="020B0303020203020204" pitchFamily="34" charset="-34"/>
+              </a:rPr>
+              <a:t> Messaging Queue </a:t>
+            </a:r>
+            <a:r>
+              <a:rPr lang="th-TH" sz="1400" dirty="0">
+                <a:solidFill>
+                  <a:schemeClr val="bg1">
+                    <a:lumMod val="50000"/>
+                  </a:schemeClr>
+                </a:solidFill>
+                <a:latin typeface="LINE Seed Sans TH" panose="020B0303020203020204" pitchFamily="34" charset="-34"/>
+                <a:ea typeface="LINE Seed Sans TH" panose="020B0303020203020204" pitchFamily="34" charset="-34"/>
+                <a:cs typeface="LINE Seed Sans TH" panose="020B0303020203020204" pitchFamily="34" charset="-34"/>
+              </a:rPr>
+              <a:t>ที่สามารถกระจายการทำงานได้</a:t>
             </a:r>
           </a:p>
           <a:p>
@@ -16359,7 +16392,7 @@
                 <a:ea typeface="LINE Seed Sans TH" panose="020B0303020203020204" pitchFamily="34" charset="-34"/>
                 <a:cs typeface="LINE Seed Sans TH" panose="020B0303020203020204" pitchFamily="34" charset="-34"/>
               </a:rPr>
-              <a:t> มอบระบบ</a:t>
+              <a:t> ที่ส่งข้อความ</a:t>
             </a:r>
           </a:p>
           <a:p>
@@ -16382,7 +16415,59 @@
                 <a:ea typeface="LINE Seed Sans TH" panose="020B0303020203020204" pitchFamily="34" charset="-34"/>
                 <a:cs typeface="LINE Seed Sans TH" panose="020B0303020203020204" pitchFamily="34" charset="-34"/>
               </a:rPr>
-              <a:t>การส่งข้อความที่ปรับขนาดได้สูง ทนต่อข้อผิดพลาด และทนทาน </a:t>
+              <a:t>ที่</a:t>
+            </a:r>
+            <a:r>
+              <a:rPr lang="th-TH" sz="1400" dirty="0" err="1">
+                <a:solidFill>
+                  <a:schemeClr val="bg1">
+                    <a:lumMod val="50000"/>
+                  </a:schemeClr>
+                </a:solidFill>
+                <a:latin typeface="LINE Seed Sans TH" panose="020B0303020203020204" pitchFamily="34" charset="-34"/>
+                <a:ea typeface="LINE Seed Sans TH" panose="020B0303020203020204" pitchFamily="34" charset="-34"/>
+                <a:cs typeface="LINE Seed Sans TH" panose="020B0303020203020204" pitchFamily="34" charset="-34"/>
+              </a:rPr>
+              <a:t>สเกล</a:t>
+            </a:r>
+            <a:r>
+              <a:rPr lang="th-TH" sz="1400" dirty="0">
+                <a:solidFill>
+                  <a:schemeClr val="bg1">
+                    <a:lumMod val="50000"/>
+                  </a:schemeClr>
+                </a:solidFill>
+                <a:latin typeface="LINE Seed Sans TH" panose="020B0303020203020204" pitchFamily="34" charset="-34"/>
+                <a:ea typeface="LINE Seed Sans TH" panose="020B0303020203020204" pitchFamily="34" charset="-34"/>
+                <a:cs typeface="LINE Seed Sans TH" panose="020B0303020203020204" pitchFamily="34" charset="-34"/>
+              </a:rPr>
+              <a:t>ได้สูง</a:t>
+            </a:r>
+            <a:r>
+              <a:rPr lang="en-US" sz="1400" dirty="0">
+                <a:solidFill>
+                  <a:schemeClr val="bg1">
+                    <a:lumMod val="50000"/>
+                  </a:schemeClr>
+                </a:solidFill>
+                <a:latin typeface="LINE Seed Sans TH" panose="020B0303020203020204" pitchFamily="34" charset="-34"/>
+                <a:ea typeface="LINE Seed Sans TH" panose="020B0303020203020204" pitchFamily="34" charset="-34"/>
+                <a:cs typeface="LINE Seed Sans TH" panose="020B0303020203020204" pitchFamily="34" charset="-34"/>
+              </a:rPr>
+              <a:t>,</a:t>
+            </a:r>
+            <a:r>
+              <a:rPr lang="th-TH" sz="1400" dirty="0">
+                <a:solidFill>
+                  <a:schemeClr val="bg1">
+                    <a:lumMod val="50000"/>
+                  </a:schemeClr>
+                </a:solidFill>
+                <a:latin typeface="LINE Seed Sans TH" panose="020B0303020203020204" pitchFamily="34" charset="-34"/>
+                <a:ea typeface="LINE Seed Sans TH" panose="020B0303020203020204" pitchFamily="34" charset="-34"/>
+                <a:cs typeface="LINE Seed Sans TH" panose="020B0303020203020204" pitchFamily="34" charset="-34"/>
+              </a:rPr>
+              <a:t> ทนต่อข้อผิดพลาด และทนทานต่อการล่ม</a:t>
             </a:r>
             <a:endParaRPr lang="en-US" sz="1400" dirty="0">
               <a:solidFill>
@@ -18226,7 +18311,7 @@
                 <a:ea typeface="LINE Seed Sans TH" panose="020B0303020203020204" pitchFamily="34" charset="-34"/>
                 <a:cs typeface="LINE Seed Sans TH" panose="020B0303020203020204" pitchFamily="34" charset="-34"/>
               </a:rPr>
-              <a:t>คอนเทนเนอร์คือตัวจัดการซอฟต์แวร์ที่มีความสัมพันธ์ทางเทคนิคกับ</a:t>
+              <a:t>คอนเทนเนอร์คือซอฟต์แวร์ที่มีความสัมพันธ์ทางเทคนิคกับ</a:t>
             </a:r>
             <a:r>
               <a:rPr lang="en-US" sz="1600" dirty="0">
@@ -18503,13 +18588,13 @@
   <p:clrMapOvr>
     <a:masterClrMapping/>
   </p:clrMapOvr>
-  <mc:AlternateContent xmlns:mc="http://schemas.openxmlformats.org/markup-compatibility/2006">
-    <mc:Choice xmlns:p159="http://schemas.microsoft.com/office/powerpoint/2015/09/main" Requires="p159">
+  <mc:AlternateContent xmlns:mc="http://schemas.openxmlformats.org/markup-compatibility/2006" xmlns:p159="http://schemas.microsoft.com/office/powerpoint/2015/09/main">
+    <mc:Choice Requires="p159">
       <p:transition xmlns:p14="http://schemas.microsoft.com/office/powerpoint/2010/main" spd="slow" p14:dur="2000">
         <p159:morph option="byObject"/>
       </p:transition>
     </mc:Choice>
-    <mc:Fallback>
+    <mc:Fallback xmlns="">
       <p:transition spd="slow">
         <p:fade/>
       </p:transition>
@@ -19093,13 +19178,13 @@
   <p:clrMapOvr>
     <a:masterClrMapping/>
   </p:clrMapOvr>
-  <mc:AlternateContent xmlns:mc="http://schemas.openxmlformats.org/markup-compatibility/2006">
-    <mc:Choice xmlns:p159="http://schemas.microsoft.com/office/powerpoint/2015/09/main" Requires="p159">
+  <mc:AlternateContent xmlns:mc="http://schemas.openxmlformats.org/markup-compatibility/2006" xmlns:p159="http://schemas.microsoft.com/office/powerpoint/2015/09/main">
+    <mc:Choice Requires="p159">
       <p:transition xmlns:p14="http://schemas.microsoft.com/office/powerpoint/2010/main" spd="slow" p14:dur="2000">
         <p159:morph option="byObject"/>
       </p:transition>
     </mc:Choice>
-    <mc:Fallback>
+    <mc:Fallback xmlns="">
       <p:transition spd="slow">
         <p:fade/>
       </p:transition>
@@ -19203,12 +19288,61 @@
           <a:p>
             <a:pPr algn="ctr"/>
             <a:r>
+              <a:rPr lang="en-US" sz="8000" b="1" dirty="0">
+                <a:latin typeface="LINE Seed Sans TH" panose="020B0303020203020204" pitchFamily="34" charset="-34"/>
+                <a:ea typeface="LINE Seed Sans TH" panose="020B0303020203020204" pitchFamily="34" charset="-34"/>
+                <a:cs typeface="LINE Seed Sans TH" panose="020B0303020203020204" pitchFamily="34" charset="-34"/>
+              </a:rPr>
+              <a:t>Take a rest and</a:t>
+            </a:r>
+            <a:endParaRPr lang="th-TH" sz="8000" b="1" dirty="0">
+              <a:latin typeface="LINE Seed Sans TH" panose="020B0303020203020204" pitchFamily="34" charset="-34"/>
+              <a:ea typeface="LINE Seed Sans TH" panose="020B0303020203020204" pitchFamily="34" charset="-34"/>
+              <a:cs typeface="LINE Seed Sans TH" panose="020B0303020203020204" pitchFamily="34" charset="-34"/>
+            </a:endParaRPr>
+          </a:p>
+          <a:p>
+            <a:pPr algn="ctr"/>
+            <a:r>
               <a:rPr lang="en-TH" sz="8000" b="1" dirty="0">
                 <a:latin typeface="LINE Seed Sans TH" panose="020B0303020203020204" pitchFamily="34" charset="-34"/>
                 <a:ea typeface="LINE Seed Sans TH" panose="020B0303020203020204" pitchFamily="34" charset="-34"/>
                 <a:cs typeface="LINE Seed Sans TH" panose="020B0303020203020204" pitchFamily="34" charset="-34"/>
               </a:rPr>
               <a:t>Let’s do workshops!</a:t>
+            </a:r>
+          </a:p>
+          <a:p>
+            <a:pPr algn="ctr"/>
+            <a:endParaRPr lang="en-TH" sz="8000" b="1" dirty="0">
+              <a:latin typeface="LINE Seed Sans TH" panose="020B0303020203020204" pitchFamily="34" charset="-34"/>
+              <a:ea typeface="LINE Seed Sans TH" panose="020B0303020203020204" pitchFamily="34" charset="-34"/>
+              <a:cs typeface="LINE Seed Sans TH" panose="020B0303020203020204" pitchFamily="34" charset="-34"/>
+            </a:endParaRPr>
+          </a:p>
+          <a:p>
+            <a:pPr algn="ctr"/>
+            <a:r>
+              <a:rPr lang="en-US" sz="6600" b="1" dirty="0">
+                <a:solidFill>
+                  <a:srgbClr val="4791E6"/>
+                </a:solidFill>
+                <a:latin typeface="LINE Seed Sans TH" panose="020B0303020203020204" pitchFamily="34" charset="-34"/>
+                <a:ea typeface="LINE Seed Sans TH" panose="020B0303020203020204" pitchFamily="34" charset="-34"/>
+                <a:cs typeface="LINE Seed Sans TH" panose="020B0303020203020204" pitchFamily="34" charset="-34"/>
+              </a:rPr>
+              <a:t>g</a:t>
+            </a:r>
+            <a:r>
+              <a:rPr lang="en-TH" sz="6600" b="1" dirty="0">
+                <a:solidFill>
+                  <a:srgbClr val="4791E6"/>
+                </a:solidFill>
+                <a:latin typeface="LINE Seed Sans TH" panose="020B0303020203020204" pitchFamily="34" charset="-34"/>
+                <a:ea typeface="LINE Seed Sans TH" panose="020B0303020203020204" pitchFamily="34" charset="-34"/>
+                <a:cs typeface="LINE Seed Sans TH" panose="020B0303020203020204" pitchFamily="34" charset="-34"/>
+              </a:rPr>
+              <a:t>ithub.com/Yothgewalt</a:t>
             </a:r>
           </a:p>
         </p:txBody>

</xml_diff>